<commit_message>
Update Executive Presentation  - Big Mountain Analysis.pptx
</commit_message>
<xml_diff>
--- a/Executive Presentation  - Big Mountain Analysis.pptx
+++ b/Executive Presentation  - Big Mountain Analysis.pptx
@@ -110,6 +110,11 @@
       </a:defRPr>
     </a:lvl9pPr>
   </p:defaultTextStyle>
+  <p:extLst>
+    <p:ext uri="{EFAFB233-063F-42B5-8137-9DF3F51BA10A}">
+      <p15:sldGuideLst xmlns:p15="http://schemas.microsoft.com/office/powerpoint/2012/main"/>
+    </p:ext>
+  </p:extLst>
 </p:presentation>
 </file>
 
@@ -260,7 +265,7 @@
           <a:p>
             <a:fld id="{3781CF87-0559-4925-B443-F8D0F354B69B}" type="datetimeFigureOut">
               <a:rPr lang="en-US" smtClean="0"/>
-              <a:t>1/16/2021</a:t>
+              <a:t>1/31/2021</a:t>
             </a:fld>
             <a:endParaRPr lang="en-US"/>
           </a:p>
@@ -458,7 +463,7 @@
           <a:p>
             <a:fld id="{3781CF87-0559-4925-B443-F8D0F354B69B}" type="datetimeFigureOut">
               <a:rPr lang="en-US" smtClean="0"/>
-              <a:t>1/16/2021</a:t>
+              <a:t>1/31/2021</a:t>
             </a:fld>
             <a:endParaRPr lang="en-US"/>
           </a:p>
@@ -666,7 +671,7 @@
           <a:p>
             <a:fld id="{3781CF87-0559-4925-B443-F8D0F354B69B}" type="datetimeFigureOut">
               <a:rPr lang="en-US" smtClean="0"/>
-              <a:t>1/16/2021</a:t>
+              <a:t>1/31/2021</a:t>
             </a:fld>
             <a:endParaRPr lang="en-US"/>
           </a:p>
@@ -864,7 +869,7 @@
           <a:p>
             <a:fld id="{3781CF87-0559-4925-B443-F8D0F354B69B}" type="datetimeFigureOut">
               <a:rPr lang="en-US" smtClean="0"/>
-              <a:t>1/16/2021</a:t>
+              <a:t>1/31/2021</a:t>
             </a:fld>
             <a:endParaRPr lang="en-US"/>
           </a:p>
@@ -1139,7 +1144,7 @@
           <a:p>
             <a:fld id="{3781CF87-0559-4925-B443-F8D0F354B69B}" type="datetimeFigureOut">
               <a:rPr lang="en-US" smtClean="0"/>
-              <a:t>1/16/2021</a:t>
+              <a:t>1/31/2021</a:t>
             </a:fld>
             <a:endParaRPr lang="en-US"/>
           </a:p>
@@ -1404,7 +1409,7 @@
           <a:p>
             <a:fld id="{3781CF87-0559-4925-B443-F8D0F354B69B}" type="datetimeFigureOut">
               <a:rPr lang="en-US" smtClean="0"/>
-              <a:t>1/16/2021</a:t>
+              <a:t>1/31/2021</a:t>
             </a:fld>
             <a:endParaRPr lang="en-US"/>
           </a:p>
@@ -1816,7 +1821,7 @@
           <a:p>
             <a:fld id="{3781CF87-0559-4925-B443-F8D0F354B69B}" type="datetimeFigureOut">
               <a:rPr lang="en-US" smtClean="0"/>
-              <a:t>1/16/2021</a:t>
+              <a:t>1/31/2021</a:t>
             </a:fld>
             <a:endParaRPr lang="en-US"/>
           </a:p>
@@ -1957,7 +1962,7 @@
           <a:p>
             <a:fld id="{3781CF87-0559-4925-B443-F8D0F354B69B}" type="datetimeFigureOut">
               <a:rPr lang="en-US" smtClean="0"/>
-              <a:t>1/16/2021</a:t>
+              <a:t>1/31/2021</a:t>
             </a:fld>
             <a:endParaRPr lang="en-US"/>
           </a:p>
@@ -2070,7 +2075,7 @@
           <a:p>
             <a:fld id="{3781CF87-0559-4925-B443-F8D0F354B69B}" type="datetimeFigureOut">
               <a:rPr lang="en-US" smtClean="0"/>
-              <a:t>1/16/2021</a:t>
+              <a:t>1/31/2021</a:t>
             </a:fld>
             <a:endParaRPr lang="en-US"/>
           </a:p>
@@ -2381,7 +2386,7 @@
           <a:p>
             <a:fld id="{3781CF87-0559-4925-B443-F8D0F354B69B}" type="datetimeFigureOut">
               <a:rPr lang="en-US" smtClean="0"/>
-              <a:t>1/16/2021</a:t>
+              <a:t>1/31/2021</a:t>
             </a:fld>
             <a:endParaRPr lang="en-US"/>
           </a:p>
@@ -2669,7 +2674,7 @@
           <a:p>
             <a:fld id="{3781CF87-0559-4925-B443-F8D0F354B69B}" type="datetimeFigureOut">
               <a:rPr lang="en-US" smtClean="0"/>
-              <a:t>1/16/2021</a:t>
+              <a:t>1/31/2021</a:t>
             </a:fld>
             <a:endParaRPr lang="en-US"/>
           </a:p>
@@ -2910,7 +2915,7 @@
           <a:p>
             <a:fld id="{3781CF87-0559-4925-B443-F8D0F354B69B}" type="datetimeFigureOut">
               <a:rPr lang="en-US" smtClean="0"/>
-              <a:t>1/16/2021</a:t>
+              <a:t>1/31/2021</a:t>
             </a:fld>
             <a:endParaRPr lang="en-US"/>
           </a:p>
@@ -4000,7 +4005,15 @@
           <a:p>
             <a:r>
               <a:rPr lang="en-US" dirty="0"/>
-              <a:t>If we try to close 10 of least use run affects ticket price.  Closing of up 5 runs or more affect the ticket price by 1% percent and revenue by 1%</a:t>
+              <a:t>If we try to close 10 of least used run it </a:t>
+            </a:r>
+            <a:r>
+              <a:rPr lang="en-US" dirty="0" err="1"/>
+              <a:t>willaffects</a:t>
+            </a:r>
+            <a:r>
+              <a:rPr lang="en-US" dirty="0"/>
+              <a:t> ticket price.  Closing of up 5 runs or more affect the ticket price by 1% percent and revenue by 1%</a:t>
             </a:r>
           </a:p>
           <a:p>
@@ -4146,7 +4159,9 @@
           </a:xfrm>
         </p:spPr>
         <p:txBody>
-          <a:bodyPr/>
+          <a:bodyPr>
+            <a:normAutofit fontScale="92500" lnSpcReduction="10000"/>
+          </a:bodyPr>
           <a:lstStyle/>
           <a:p>
             <a:r>
@@ -4160,6 +4175,14 @@
             </a:r>
           </a:p>
           <a:p>
+            <a:endParaRPr lang="en-US" dirty="0">
+              <a:solidFill>
+                <a:srgbClr val="000000"/>
+              </a:solidFill>
+              <a:latin typeface="Helvetica Neue"/>
+            </a:endParaRPr>
+          </a:p>
+          <a:p>
             <a:r>
               <a:rPr lang="en-US" dirty="0">
                 <a:solidFill>
@@ -4171,6 +4194,14 @@
             </a:r>
           </a:p>
           <a:p>
+            <a:endParaRPr lang="en-US" dirty="0">
+              <a:solidFill>
+                <a:srgbClr val="000000"/>
+              </a:solidFill>
+              <a:latin typeface="Helvetica Neue"/>
+            </a:endParaRPr>
+          </a:p>
+          <a:p>
             <a:r>
               <a:rPr lang="en-US" dirty="0">
                 <a:solidFill>
@@ -4180,6 +4211,14 @@
               </a:rPr>
               <a:t>The additional operating cost of chair lift would support additional revenue of $3,474,638.  This will pay for the investment within 1 season. </a:t>
             </a:r>
+          </a:p>
+          <a:p>
+            <a:endParaRPr lang="en-US" dirty="0">
+              <a:solidFill>
+                <a:srgbClr val="000000"/>
+              </a:solidFill>
+              <a:latin typeface="Helvetica Neue"/>
+            </a:endParaRPr>
           </a:p>
           <a:p>
             <a:r>

</xml_diff>